<commit_message>
Added notes on improving class00 and class01.
</commit_message>
<xml_diff>
--- a/talks/src/class00.pptx
+++ b/talks/src/class00.pptx
@@ -244,7 +244,7 @@
           <a:p>
             <a:fld id="{56C6788E-680A-49E5-BB93-D456A9D23A29}" type="datetimeFigureOut">
               <a:rPr lang="ru-RU" smtClean="0"/>
-              <a:t>17.09.2018</a:t>
+              <a:t>10.12.2018</a:t>
             </a:fld>
             <a:endParaRPr lang="ru-RU"/>
           </a:p>
@@ -413,7 +413,7 @@
           <a:p>
             <a:fld id="{C4DF4945-C160-4CD5-B124-49B9BE14C0AB}" type="datetimeFigureOut">
               <a:rPr lang="ru-RU" smtClean="0"/>
-              <a:t>17.09.2018</a:t>
+              <a:t>10.12.2018</a:t>
             </a:fld>
             <a:endParaRPr lang="ru-RU"/>
           </a:p>
@@ -5159,7 +5159,7 @@
           <a:p>
             <a:fld id="{12C63722-5D9F-4E99-9720-9B6A0C7BB1C9}" type="datetimeFigureOut">
               <a:rPr lang="ru-RU" smtClean="0"/>
-              <a:t>17.09.2018</a:t>
+              <a:t>10.12.2018</a:t>
             </a:fld>
             <a:endParaRPr lang="ru-RU"/>
           </a:p>
@@ -5329,7 +5329,7 @@
           <a:p>
             <a:fld id="{12C63722-5D9F-4E99-9720-9B6A0C7BB1C9}" type="datetimeFigureOut">
               <a:rPr lang="ru-RU" smtClean="0"/>
-              <a:t>17.09.2018</a:t>
+              <a:t>10.12.2018</a:t>
             </a:fld>
             <a:endParaRPr lang="ru-RU"/>
           </a:p>
@@ -5509,7 +5509,7 @@
           <a:p>
             <a:fld id="{12C63722-5D9F-4E99-9720-9B6A0C7BB1C9}" type="datetimeFigureOut">
               <a:rPr lang="ru-RU" smtClean="0"/>
-              <a:t>17.09.2018</a:t>
+              <a:t>10.12.2018</a:t>
             </a:fld>
             <a:endParaRPr lang="ru-RU"/>
           </a:p>
@@ -5701,7 +5701,7 @@
           <a:p>
             <a:fld id="{8C218C88-2408-4CFC-B25C-07450930B282}" type="datetimeFigureOut">
               <a:rPr lang="ru-RU" smtClean="0"/>
-              <a:t>17.09.2018</a:t>
+              <a:t>10.12.2018</a:t>
             </a:fld>
             <a:endParaRPr lang="ru-RU"/>
           </a:p>
@@ -5871,7 +5871,7 @@
           <a:p>
             <a:fld id="{8C218C88-2408-4CFC-B25C-07450930B282}" type="datetimeFigureOut">
               <a:rPr lang="ru-RU" smtClean="0"/>
-              <a:t>17.09.2018</a:t>
+              <a:t>10.12.2018</a:t>
             </a:fld>
             <a:endParaRPr lang="ru-RU"/>
           </a:p>
@@ -6117,7 +6117,7 @@
           <a:p>
             <a:fld id="{8C218C88-2408-4CFC-B25C-07450930B282}" type="datetimeFigureOut">
               <a:rPr lang="ru-RU" smtClean="0"/>
-              <a:t>17.09.2018</a:t>
+              <a:t>10.12.2018</a:t>
             </a:fld>
             <a:endParaRPr lang="ru-RU"/>
           </a:p>
@@ -6349,7 +6349,7 @@
           <a:p>
             <a:fld id="{8C218C88-2408-4CFC-B25C-07450930B282}" type="datetimeFigureOut">
               <a:rPr lang="ru-RU" smtClean="0"/>
-              <a:t>17.09.2018</a:t>
+              <a:t>10.12.2018</a:t>
             </a:fld>
             <a:endParaRPr lang="ru-RU"/>
           </a:p>
@@ -6716,7 +6716,7 @@
           <a:p>
             <a:fld id="{8C218C88-2408-4CFC-B25C-07450930B282}" type="datetimeFigureOut">
               <a:rPr lang="ru-RU" smtClean="0"/>
-              <a:t>17.09.2018</a:t>
+              <a:t>10.12.2018</a:t>
             </a:fld>
             <a:endParaRPr lang="ru-RU"/>
           </a:p>
@@ -6834,7 +6834,7 @@
           <a:p>
             <a:fld id="{8C218C88-2408-4CFC-B25C-07450930B282}" type="datetimeFigureOut">
               <a:rPr lang="ru-RU" smtClean="0"/>
-              <a:t>17.09.2018</a:t>
+              <a:t>10.12.2018</a:t>
             </a:fld>
             <a:endParaRPr lang="ru-RU"/>
           </a:p>
@@ -6929,7 +6929,7 @@
           <a:p>
             <a:fld id="{8C218C88-2408-4CFC-B25C-07450930B282}" type="datetimeFigureOut">
               <a:rPr lang="ru-RU" smtClean="0"/>
-              <a:t>17.09.2018</a:t>
+              <a:t>10.12.2018</a:t>
             </a:fld>
             <a:endParaRPr lang="ru-RU"/>
           </a:p>
@@ -7206,7 +7206,7 @@
           <a:p>
             <a:fld id="{8C218C88-2408-4CFC-B25C-07450930B282}" type="datetimeFigureOut">
               <a:rPr lang="ru-RU" smtClean="0"/>
-              <a:t>17.09.2018</a:t>
+              <a:t>10.12.2018</a:t>
             </a:fld>
             <a:endParaRPr lang="ru-RU"/>
           </a:p>
@@ -7376,7 +7376,7 @@
           <a:p>
             <a:fld id="{12C63722-5D9F-4E99-9720-9B6A0C7BB1C9}" type="datetimeFigureOut">
               <a:rPr lang="ru-RU" smtClean="0"/>
-              <a:t>17.09.2018</a:t>
+              <a:t>10.12.2018</a:t>
             </a:fld>
             <a:endParaRPr lang="ru-RU"/>
           </a:p>
@@ -7629,7 +7629,7 @@
           <a:p>
             <a:fld id="{8C218C88-2408-4CFC-B25C-07450930B282}" type="datetimeFigureOut">
               <a:rPr lang="ru-RU" smtClean="0"/>
-              <a:t>17.09.2018</a:t>
+              <a:t>10.12.2018</a:t>
             </a:fld>
             <a:endParaRPr lang="ru-RU"/>
           </a:p>
@@ -7799,7 +7799,7 @@
           <a:p>
             <a:fld id="{8C218C88-2408-4CFC-B25C-07450930B282}" type="datetimeFigureOut">
               <a:rPr lang="ru-RU" smtClean="0"/>
-              <a:t>17.09.2018</a:t>
+              <a:t>10.12.2018</a:t>
             </a:fld>
             <a:endParaRPr lang="ru-RU"/>
           </a:p>
@@ -7979,7 +7979,7 @@
           <a:p>
             <a:fld id="{8C218C88-2408-4CFC-B25C-07450930B282}" type="datetimeFigureOut">
               <a:rPr lang="ru-RU" smtClean="0"/>
-              <a:t>17.09.2018</a:t>
+              <a:t>10.12.2018</a:t>
             </a:fld>
             <a:endParaRPr lang="ru-RU"/>
           </a:p>
@@ -8225,7 +8225,7 @@
           <a:p>
             <a:fld id="{12C63722-5D9F-4E99-9720-9B6A0C7BB1C9}" type="datetimeFigureOut">
               <a:rPr lang="ru-RU" smtClean="0"/>
-              <a:t>17.09.2018</a:t>
+              <a:t>10.12.2018</a:t>
             </a:fld>
             <a:endParaRPr lang="ru-RU"/>
           </a:p>
@@ -8465,7 +8465,7 @@
           <a:p>
             <a:fld id="{12C63722-5D9F-4E99-9720-9B6A0C7BB1C9}" type="datetimeFigureOut">
               <a:rPr lang="ru-RU" smtClean="0"/>
-              <a:t>17.09.2018</a:t>
+              <a:t>10.12.2018</a:t>
             </a:fld>
             <a:endParaRPr lang="ru-RU"/>
           </a:p>
@@ -8832,7 +8832,7 @@
           <a:p>
             <a:fld id="{12C63722-5D9F-4E99-9720-9B6A0C7BB1C9}" type="datetimeFigureOut">
               <a:rPr lang="ru-RU" smtClean="0"/>
-              <a:t>17.09.2018</a:t>
+              <a:t>10.12.2018</a:t>
             </a:fld>
             <a:endParaRPr lang="ru-RU"/>
           </a:p>
@@ -8950,7 +8950,7 @@
           <a:p>
             <a:fld id="{12C63722-5D9F-4E99-9720-9B6A0C7BB1C9}" type="datetimeFigureOut">
               <a:rPr lang="ru-RU" smtClean="0"/>
-              <a:t>17.09.2018</a:t>
+              <a:t>10.12.2018</a:t>
             </a:fld>
             <a:endParaRPr lang="ru-RU"/>
           </a:p>
@@ -9045,7 +9045,7 @@
           <a:p>
             <a:fld id="{12C63722-5D9F-4E99-9720-9B6A0C7BB1C9}" type="datetimeFigureOut">
               <a:rPr lang="ru-RU" smtClean="0"/>
-              <a:t>17.09.2018</a:t>
+              <a:t>10.12.2018</a:t>
             </a:fld>
             <a:endParaRPr lang="ru-RU"/>
           </a:p>
@@ -9322,7 +9322,7 @@
           <a:p>
             <a:fld id="{12C63722-5D9F-4E99-9720-9B6A0C7BB1C9}" type="datetimeFigureOut">
               <a:rPr lang="ru-RU" smtClean="0"/>
-              <a:t>17.09.2018</a:t>
+              <a:t>10.12.2018</a:t>
             </a:fld>
             <a:endParaRPr lang="ru-RU"/>
           </a:p>
@@ -9575,7 +9575,7 @@
           <a:p>
             <a:fld id="{12C63722-5D9F-4E99-9720-9B6A0C7BB1C9}" type="datetimeFigureOut">
               <a:rPr lang="ru-RU" smtClean="0"/>
-              <a:t>17.09.2018</a:t>
+              <a:t>10.12.2018</a:t>
             </a:fld>
             <a:endParaRPr lang="ru-RU"/>
           </a:p>
@@ -9788,7 +9788,7 @@
           <a:p>
             <a:fld id="{12C63722-5D9F-4E99-9720-9B6A0C7BB1C9}" type="datetimeFigureOut">
               <a:rPr lang="ru-RU" smtClean="0"/>
-              <a:t>17.09.2018</a:t>
+              <a:t>10.12.2018</a:t>
             </a:fld>
             <a:endParaRPr lang="ru-RU"/>
           </a:p>
@@ -10328,7 +10328,7 @@
           <a:p>
             <a:fld id="{8C218C88-2408-4CFC-B25C-07450930B282}" type="datetimeFigureOut">
               <a:rPr lang="ru-RU" smtClean="0"/>
-              <a:t>17.09.2018</a:t>
+              <a:t>10.12.2018</a:t>
             </a:fld>
             <a:endParaRPr lang="ru-RU"/>
           </a:p>
@@ -17816,6 +17816,76 @@
           </a:fontRef>
         </p:style>
       </p:cxnSp>
+      <p:sp>
+        <p:nvSpPr>
+          <p:cNvPr id="8" name="Rounded Rectangle 7">
+            <a:extLst>
+              <a:ext uri="{FF2B5EF4-FFF2-40B4-BE49-F238E27FC236}">
+                <a16:creationId xmlns:a16="http://schemas.microsoft.com/office/drawing/2014/main" id="{6949ADF6-6F45-B448-8FCD-CDD873200D01}"/>
+              </a:ext>
+            </a:extLst>
+          </p:cNvPr>
+          <p:cNvSpPr/>
+          <p:nvPr/>
+        </p:nvSpPr>
+        <p:spPr>
+          <a:xfrm>
+            <a:off x="3283027" y="4192446"/>
+            <a:ext cx="3076584" cy="1756662"/>
+          </a:xfrm>
+          <a:prstGeom prst="roundRect">
+            <a:avLst/>
+          </a:prstGeom>
+        </p:spPr>
+        <p:style>
+          <a:lnRef idx="2">
+            <a:schemeClr val="accent1">
+              <a:shade val="50000"/>
+            </a:schemeClr>
+          </a:lnRef>
+          <a:fillRef idx="1">
+            <a:schemeClr val="accent1"/>
+          </a:fillRef>
+          <a:effectRef idx="0">
+            <a:schemeClr val="accent1"/>
+          </a:effectRef>
+          <a:fontRef idx="minor">
+            <a:schemeClr val="lt1"/>
+          </a:fontRef>
+        </p:style>
+        <p:txBody>
+          <a:bodyPr rtlCol="0" anchor="ctr"/>
+          <a:lstStyle/>
+          <a:p>
+            <a:pPr algn="ctr"/>
+            <a:r>
+              <a:rPr lang="ru-RU" dirty="0"/>
+              <a:t>Стоит рассказать о том, что </a:t>
+            </a:r>
+            <a:r>
+              <a:rPr lang="en-US" dirty="0"/>
+              <a:t>RAM – </a:t>
+            </a:r>
+            <a:r>
+              <a:rPr lang="ru-RU" dirty="0"/>
+              <a:t>это тоже не память со случайным доступом и там есть свои </a:t>
+            </a:r>
+            <a:r>
+              <a:rPr lang="en-US" dirty="0"/>
+              <a:t>”seeks” – RAS </a:t>
+            </a:r>
+            <a:r>
+              <a:rPr lang="ru-RU" dirty="0"/>
+              <a:t>и </a:t>
+            </a:r>
+            <a:r>
+              <a:rPr lang="en-US"/>
+              <a:t>CAS.</a:t>
+            </a:r>
+            <a:endParaRPr lang="ru-RU"/>
+          </a:p>
+        </p:txBody>
+      </p:sp>
     </p:spTree>
     <p:extLst>
       <p:ext uri="{BB962C8B-B14F-4D97-AF65-F5344CB8AC3E}">
@@ -26345,6 +26415,131 @@
           </a:graphicData>
         </a:graphic>
       </p:graphicFrame>
+      <p:sp>
+        <p:nvSpPr>
+          <p:cNvPr id="3" name="TextBox 2">
+            <a:extLst>
+              <a:ext uri="{FF2B5EF4-FFF2-40B4-BE49-F238E27FC236}">
+                <a16:creationId xmlns:a16="http://schemas.microsoft.com/office/drawing/2014/main" id="{2AD551B9-E397-8140-AA81-250FF7A0D662}"/>
+              </a:ext>
+            </a:extLst>
+          </p:cNvPr>
+          <p:cNvSpPr txBox="1"/>
+          <p:nvPr/>
+        </p:nvSpPr>
+        <p:spPr>
+          <a:xfrm>
+            <a:off x="2478795" y="2930487"/>
+            <a:ext cx="6444868" cy="2308324"/>
+          </a:xfrm>
+          <a:prstGeom prst="rect">
+            <a:avLst/>
+          </a:prstGeom>
+          <a:noFill/>
+        </p:spPr>
+        <p:txBody>
+          <a:bodyPr wrap="square" rtlCol="0">
+            <a:spAutoFit/>
+          </a:bodyPr>
+          <a:lstStyle/>
+          <a:p>
+            <a:r>
+              <a:rPr lang="ru-RU" dirty="0"/>
+              <a:t>Рассказать о </a:t>
+            </a:r>
+            <a:r>
+              <a:rPr lang="en-US" dirty="0"/>
+              <a:t>race conditions:</a:t>
+            </a:r>
+          </a:p>
+          <a:p>
+            <a:endParaRPr lang="en-US" dirty="0"/>
+          </a:p>
+          <a:p>
+            <a:r>
+              <a:rPr lang="en-US" dirty="0"/>
+              <a:t>if (access(path, R_OK)) {</a:t>
+            </a:r>
+          </a:p>
+          <a:p>
+            <a:r>
+              <a:rPr lang="en-US" dirty="0"/>
+              <a:t>  </a:t>
+            </a:r>
+            <a:r>
+              <a:rPr lang="en-US" dirty="0" err="1"/>
+              <a:t>int</a:t>
+            </a:r>
+            <a:r>
+              <a:rPr lang="en-US" dirty="0"/>
+              <a:t> </a:t>
+            </a:r>
+            <a:r>
+              <a:rPr lang="en-US" dirty="0" err="1"/>
+              <a:t>fd</a:t>
+            </a:r>
+            <a:r>
+              <a:rPr lang="en-US" dirty="0"/>
+              <a:t> = open(path, O_RDONLY);</a:t>
+            </a:r>
+            <a:br>
+              <a:rPr lang="en-US" dirty="0"/>
+            </a:br>
+            <a:r>
+              <a:rPr lang="en-US" dirty="0"/>
+              <a:t>}</a:t>
+            </a:r>
+          </a:p>
+          <a:p>
+            <a:endParaRPr lang="en-US" dirty="0"/>
+          </a:p>
+          <a:p>
+            <a:r>
+              <a:rPr lang="en-US" dirty="0" err="1"/>
+              <a:t>lstat</a:t>
+            </a:r>
+            <a:r>
+              <a:rPr lang="en-US" dirty="0"/>
+              <a:t>(link, &amp;</a:t>
+            </a:r>
+            <a:r>
+              <a:rPr lang="en-US" dirty="0" err="1"/>
+              <a:t>st</a:t>
+            </a:r>
+            <a:r>
+              <a:rPr lang="en-US" dirty="0"/>
+              <a:t>);</a:t>
+            </a:r>
+          </a:p>
+          <a:p>
+            <a:r>
+              <a:rPr lang="en-US" dirty="0" err="1"/>
+              <a:t>readlink</a:t>
+            </a:r>
+            <a:r>
+              <a:rPr lang="en-US" dirty="0"/>
+              <a:t>(link, </a:t>
+            </a:r>
+            <a:r>
+              <a:rPr lang="en-US" dirty="0" err="1"/>
+              <a:t>buf</a:t>
+            </a:r>
+            <a:r>
+              <a:rPr lang="en-US" dirty="0"/>
+              <a:t>, </a:t>
+            </a:r>
+            <a:r>
+              <a:rPr lang="en-US" dirty="0" err="1"/>
+              <a:t>st.st_size</a:t>
+            </a:r>
+            <a:r>
+              <a:rPr lang="en-US" dirty="0"/>
+              <a:t>);</a:t>
+            </a:r>
+            <a:endParaRPr lang="ru-RU" dirty="0"/>
+          </a:p>
+        </p:txBody>
+      </p:sp>
     </p:spTree>
     <p:extLst>
       <p:ext uri="{BB962C8B-B14F-4D97-AF65-F5344CB8AC3E}">

</xml_diff>